<commit_message>
Added Gemini API to requirements.txt
</commit_message>
<xml_diff>
--- a/format25.pptx
+++ b/format25.pptx
@@ -74,7 +74,7 @@
         <p:txBody>
           <a:bodyPr/>
           <a:p>
-            <a:fld id="{94DA9EB0-2083-4F5B-BF0B-AC2745D9B9F5}" type="slidenum">
+            <a:fld id="{4710D8D3-81BE-46D8-90DA-7A570AC0225E}" type="slidenum">
               <a:t>&lt;#&gt;</a:t>
             </a:fld>
           </a:p>
@@ -125,7 +125,7 @@
       </p:grpSpPr>
       <p:sp>
         <p:nvSpPr>
-          <p:cNvPr id="30" name="PlaceHolder 1"/>
+          <p:cNvPr id="26" name="PlaceHolder 1"/>
           <p:cNvSpPr>
             <a:spLocks noGrp="1"/>
           </p:cNvSpPr>
@@ -135,8 +135,8 @@
         </p:nvSpPr>
         <p:spPr>
           <a:xfrm>
-            <a:off x="540000" y="450000"/>
-            <a:ext cx="8640000" cy="630000"/>
+            <a:off x="504000" y="226080"/>
+            <a:ext cx="9071640" cy="946440"/>
           </a:xfrm>
           <a:prstGeom prst="rect">
             <a:avLst/>
@@ -151,15 +151,18 @@
             <a:noAutofit/>
           </a:bodyPr>
           <a:p>
-            <a:endParaRPr b="0" lang="en-US" sz="2700" spc="-1" strike="noStrike">
-              <a:latin typeface="Arial"/>
-            </a:endParaRPr>
-          </a:p>
-        </p:txBody>
-      </p:sp>
-      <p:sp>
-        <p:nvSpPr>
-          <p:cNvPr id="31" name="PlaceHolder 2"/>
+            <a:pPr algn="ctr">
+              <a:buNone/>
+            </a:pPr>
+            <a:endParaRPr b="0" lang="en-US" sz="4400" spc="-1" strike="noStrike">
+              <a:latin typeface="Arial"/>
+            </a:endParaRPr>
+          </a:p>
+        </p:txBody>
+      </p:sp>
+      <p:sp>
+        <p:nvSpPr>
+          <p:cNvPr id="27" name="PlaceHolder 2"/>
           <p:cNvSpPr>
             <a:spLocks noGrp="1"/>
           </p:cNvSpPr>
@@ -169,8 +172,8 @@
         </p:nvSpPr>
         <p:spPr>
           <a:xfrm>
-            <a:off x="540000" y="1350000"/>
-            <a:ext cx="9000000" cy="1716840"/>
+            <a:off x="504000" y="1326600"/>
+            <a:ext cx="9071640" cy="1568160"/>
           </a:xfrm>
           <a:prstGeom prst="rect">
             <a:avLst/>
@@ -185,15 +188,15 @@
             <a:normAutofit/>
           </a:bodyPr>
           <a:p>
-            <a:endParaRPr b="0" lang="en-US" sz="2000" spc="-1" strike="noStrike">
-              <a:latin typeface="Arial"/>
-            </a:endParaRPr>
-          </a:p>
-        </p:txBody>
-      </p:sp>
-      <p:sp>
-        <p:nvSpPr>
-          <p:cNvPr id="32" name="PlaceHolder 3"/>
+            <a:endParaRPr b="0" lang="en-US" sz="3200" spc="-1" strike="noStrike">
+              <a:latin typeface="Arial"/>
+            </a:endParaRPr>
+          </a:p>
+        </p:txBody>
+      </p:sp>
+      <p:sp>
+        <p:nvSpPr>
+          <p:cNvPr id="28" name="PlaceHolder 3"/>
           <p:cNvSpPr>
             <a:spLocks noGrp="1"/>
           </p:cNvSpPr>
@@ -203,8 +206,8 @@
         </p:nvSpPr>
         <p:spPr>
           <a:xfrm>
-            <a:off x="540000" y="3230280"/>
-            <a:ext cx="9000000" cy="1716840"/>
+            <a:off x="504000" y="3044160"/>
+            <a:ext cx="9071640" cy="1568160"/>
           </a:xfrm>
           <a:prstGeom prst="rect">
             <a:avLst/>
@@ -219,7 +222,7 @@
             <a:normAutofit/>
           </a:bodyPr>
           <a:p>
-            <a:endParaRPr b="0" lang="en-US" sz="2000" spc="-1" strike="noStrike">
+            <a:endParaRPr b="0" lang="en-US" sz="3200" spc="-1" strike="noStrike">
               <a:latin typeface="Arial"/>
             </a:endParaRPr>
           </a:p>
@@ -259,7 +262,7 @@
         <p:txBody>
           <a:bodyPr/>
           <a:p>
-            <a:fld id="{2038DECB-456F-4B86-AA55-A919B2F65DAE}" type="slidenum">
+            <a:fld id="{E294DD99-3E27-4E2A-96D9-DC43F6E49F27}" type="slidenum">
               <a:t>&lt;#&gt;</a:t>
             </a:fld>
           </a:p>
@@ -310,7 +313,7 @@
       </p:grpSpPr>
       <p:sp>
         <p:nvSpPr>
-          <p:cNvPr id="33" name="PlaceHolder 1"/>
+          <p:cNvPr id="29" name="PlaceHolder 1"/>
           <p:cNvSpPr>
             <a:spLocks noGrp="1"/>
           </p:cNvSpPr>
@@ -320,8 +323,8 @@
         </p:nvSpPr>
         <p:spPr>
           <a:xfrm>
-            <a:off x="540000" y="450000"/>
-            <a:ext cx="8640000" cy="630000"/>
+            <a:off x="504000" y="226080"/>
+            <a:ext cx="9071640" cy="946440"/>
           </a:xfrm>
           <a:prstGeom prst="rect">
             <a:avLst/>
@@ -336,15 +339,18 @@
             <a:noAutofit/>
           </a:bodyPr>
           <a:p>
-            <a:endParaRPr b="0" lang="en-US" sz="2700" spc="-1" strike="noStrike">
-              <a:latin typeface="Arial"/>
-            </a:endParaRPr>
-          </a:p>
-        </p:txBody>
-      </p:sp>
-      <p:sp>
-        <p:nvSpPr>
-          <p:cNvPr id="34" name="PlaceHolder 2"/>
+            <a:pPr algn="ctr">
+              <a:buNone/>
+            </a:pPr>
+            <a:endParaRPr b="0" lang="en-US" sz="4400" spc="-1" strike="noStrike">
+              <a:latin typeface="Arial"/>
+            </a:endParaRPr>
+          </a:p>
+        </p:txBody>
+      </p:sp>
+      <p:sp>
+        <p:nvSpPr>
+          <p:cNvPr id="30" name="PlaceHolder 2"/>
           <p:cNvSpPr>
             <a:spLocks noGrp="1"/>
           </p:cNvSpPr>
@@ -354,8 +360,8 @@
         </p:nvSpPr>
         <p:spPr>
           <a:xfrm>
-            <a:off x="540000" y="1350000"/>
-            <a:ext cx="4391640" cy="1716840"/>
+            <a:off x="504000" y="1326600"/>
+            <a:ext cx="4426920" cy="1568160"/>
           </a:xfrm>
           <a:prstGeom prst="rect">
             <a:avLst/>
@@ -370,15 +376,15 @@
             <a:normAutofit/>
           </a:bodyPr>
           <a:p>
-            <a:endParaRPr b="0" lang="en-US" sz="2000" spc="-1" strike="noStrike">
-              <a:latin typeface="Arial"/>
-            </a:endParaRPr>
-          </a:p>
-        </p:txBody>
-      </p:sp>
-      <p:sp>
-        <p:nvSpPr>
-          <p:cNvPr id="35" name="PlaceHolder 3"/>
+            <a:endParaRPr b="0" lang="en-US" sz="3200" spc="-1" strike="noStrike">
+              <a:latin typeface="Arial"/>
+            </a:endParaRPr>
+          </a:p>
+        </p:txBody>
+      </p:sp>
+      <p:sp>
+        <p:nvSpPr>
+          <p:cNvPr id="31" name="PlaceHolder 3"/>
           <p:cNvSpPr>
             <a:spLocks noGrp="1"/>
           </p:cNvSpPr>
@@ -388,8 +394,8 @@
         </p:nvSpPr>
         <p:spPr>
           <a:xfrm>
-            <a:off x="5151600" y="1350000"/>
-            <a:ext cx="4391640" cy="1716840"/>
+            <a:off x="5152680" y="1326600"/>
+            <a:ext cx="4426920" cy="1568160"/>
           </a:xfrm>
           <a:prstGeom prst="rect">
             <a:avLst/>
@@ -404,15 +410,15 @@
             <a:normAutofit/>
           </a:bodyPr>
           <a:p>
-            <a:endParaRPr b="0" lang="en-US" sz="2000" spc="-1" strike="noStrike">
-              <a:latin typeface="Arial"/>
-            </a:endParaRPr>
-          </a:p>
-        </p:txBody>
-      </p:sp>
-      <p:sp>
-        <p:nvSpPr>
-          <p:cNvPr id="36" name="PlaceHolder 4"/>
+            <a:endParaRPr b="0" lang="en-US" sz="3200" spc="-1" strike="noStrike">
+              <a:latin typeface="Arial"/>
+            </a:endParaRPr>
+          </a:p>
+        </p:txBody>
+      </p:sp>
+      <p:sp>
+        <p:nvSpPr>
+          <p:cNvPr id="32" name="PlaceHolder 4"/>
           <p:cNvSpPr>
             <a:spLocks noGrp="1"/>
           </p:cNvSpPr>
@@ -422,8 +428,8 @@
         </p:nvSpPr>
         <p:spPr>
           <a:xfrm>
-            <a:off x="540000" y="3230280"/>
-            <a:ext cx="4391640" cy="1716840"/>
+            <a:off x="504000" y="3044160"/>
+            <a:ext cx="4426920" cy="1568160"/>
           </a:xfrm>
           <a:prstGeom prst="rect">
             <a:avLst/>
@@ -438,15 +444,15 @@
             <a:normAutofit/>
           </a:bodyPr>
           <a:p>
-            <a:endParaRPr b="0" lang="en-US" sz="2000" spc="-1" strike="noStrike">
-              <a:latin typeface="Arial"/>
-            </a:endParaRPr>
-          </a:p>
-        </p:txBody>
-      </p:sp>
-      <p:sp>
-        <p:nvSpPr>
-          <p:cNvPr id="37" name="PlaceHolder 5"/>
+            <a:endParaRPr b="0" lang="en-US" sz="3200" spc="-1" strike="noStrike">
+              <a:latin typeface="Arial"/>
+            </a:endParaRPr>
+          </a:p>
+        </p:txBody>
+      </p:sp>
+      <p:sp>
+        <p:nvSpPr>
+          <p:cNvPr id="33" name="PlaceHolder 5"/>
           <p:cNvSpPr>
             <a:spLocks noGrp="1"/>
           </p:cNvSpPr>
@@ -456,8 +462,8 @@
         </p:nvSpPr>
         <p:spPr>
           <a:xfrm>
-            <a:off x="5151600" y="3230280"/>
-            <a:ext cx="4391640" cy="1716840"/>
+            <a:off x="5152680" y="3044160"/>
+            <a:ext cx="4426920" cy="1568160"/>
           </a:xfrm>
           <a:prstGeom prst="rect">
             <a:avLst/>
@@ -472,7 +478,7 @@
             <a:normAutofit/>
           </a:bodyPr>
           <a:p>
-            <a:endParaRPr b="0" lang="en-US" sz="2000" spc="-1" strike="noStrike">
+            <a:endParaRPr b="0" lang="en-US" sz="3200" spc="-1" strike="noStrike">
               <a:latin typeface="Arial"/>
             </a:endParaRPr>
           </a:p>
@@ -512,7 +518,7 @@
         <p:txBody>
           <a:bodyPr/>
           <a:p>
-            <a:fld id="{0B91C551-A2E1-4302-8098-D75BC41BB3F3}" type="slidenum">
+            <a:fld id="{B59E614F-513A-4A61-85F8-AD5B0D3C0B44}" type="slidenum">
               <a:t>&lt;#&gt;</a:t>
             </a:fld>
           </a:p>
@@ -563,7 +569,7 @@
       </p:grpSpPr>
       <p:sp>
         <p:nvSpPr>
-          <p:cNvPr id="38" name="PlaceHolder 1"/>
+          <p:cNvPr id="34" name="PlaceHolder 1"/>
           <p:cNvSpPr>
             <a:spLocks noGrp="1"/>
           </p:cNvSpPr>
@@ -573,8 +579,8 @@
         </p:nvSpPr>
         <p:spPr>
           <a:xfrm>
-            <a:off x="540000" y="450000"/>
-            <a:ext cx="8640000" cy="630000"/>
+            <a:off x="504000" y="226080"/>
+            <a:ext cx="9071640" cy="946440"/>
           </a:xfrm>
           <a:prstGeom prst="rect">
             <a:avLst/>
@@ -589,15 +595,18 @@
             <a:noAutofit/>
           </a:bodyPr>
           <a:p>
-            <a:endParaRPr b="0" lang="en-US" sz="2700" spc="-1" strike="noStrike">
-              <a:latin typeface="Arial"/>
-            </a:endParaRPr>
-          </a:p>
-        </p:txBody>
-      </p:sp>
-      <p:sp>
-        <p:nvSpPr>
-          <p:cNvPr id="39" name="PlaceHolder 2"/>
+            <a:pPr algn="ctr">
+              <a:buNone/>
+            </a:pPr>
+            <a:endParaRPr b="0" lang="en-US" sz="4400" spc="-1" strike="noStrike">
+              <a:latin typeface="Arial"/>
+            </a:endParaRPr>
+          </a:p>
+        </p:txBody>
+      </p:sp>
+      <p:sp>
+        <p:nvSpPr>
+          <p:cNvPr id="35" name="PlaceHolder 2"/>
           <p:cNvSpPr>
             <a:spLocks noGrp="1"/>
           </p:cNvSpPr>
@@ -607,8 +616,8 @@
         </p:nvSpPr>
         <p:spPr>
           <a:xfrm>
-            <a:off x="540000" y="1350000"/>
-            <a:ext cx="2897640" cy="1716840"/>
+            <a:off x="504000" y="1326600"/>
+            <a:ext cx="2920680" cy="1568160"/>
           </a:xfrm>
           <a:prstGeom prst="rect">
             <a:avLst/>
@@ -623,15 +632,15 @@
             <a:normAutofit/>
           </a:bodyPr>
           <a:p>
-            <a:endParaRPr b="0" lang="en-US" sz="2000" spc="-1" strike="noStrike">
-              <a:latin typeface="Arial"/>
-            </a:endParaRPr>
-          </a:p>
-        </p:txBody>
-      </p:sp>
-      <p:sp>
-        <p:nvSpPr>
-          <p:cNvPr id="40" name="PlaceHolder 3"/>
+            <a:endParaRPr b="0" lang="en-US" sz="3200" spc="-1" strike="noStrike">
+              <a:latin typeface="Arial"/>
+            </a:endParaRPr>
+          </a:p>
+        </p:txBody>
+      </p:sp>
+      <p:sp>
+        <p:nvSpPr>
+          <p:cNvPr id="36" name="PlaceHolder 3"/>
           <p:cNvSpPr>
             <a:spLocks noGrp="1"/>
           </p:cNvSpPr>
@@ -641,8 +650,8 @@
         </p:nvSpPr>
         <p:spPr>
           <a:xfrm>
-            <a:off x="3583080" y="1350000"/>
-            <a:ext cx="2897640" cy="1716840"/>
+            <a:off x="3571200" y="1326600"/>
+            <a:ext cx="2920680" cy="1568160"/>
           </a:xfrm>
           <a:prstGeom prst="rect">
             <a:avLst/>
@@ -657,15 +666,15 @@
             <a:normAutofit/>
           </a:bodyPr>
           <a:p>
-            <a:endParaRPr b="0" lang="en-US" sz="2000" spc="-1" strike="noStrike">
-              <a:latin typeface="Arial"/>
-            </a:endParaRPr>
-          </a:p>
-        </p:txBody>
-      </p:sp>
-      <p:sp>
-        <p:nvSpPr>
-          <p:cNvPr id="41" name="PlaceHolder 4"/>
+            <a:endParaRPr b="0" lang="en-US" sz="3200" spc="-1" strike="noStrike">
+              <a:latin typeface="Arial"/>
+            </a:endParaRPr>
+          </a:p>
+        </p:txBody>
+      </p:sp>
+      <p:sp>
+        <p:nvSpPr>
+          <p:cNvPr id="37" name="PlaceHolder 4"/>
           <p:cNvSpPr>
             <a:spLocks noGrp="1"/>
           </p:cNvSpPr>
@@ -675,8 +684,8 @@
         </p:nvSpPr>
         <p:spPr>
           <a:xfrm>
-            <a:off x="6625800" y="1350000"/>
-            <a:ext cx="2897640" cy="1716840"/>
+            <a:off x="6638040" y="1326600"/>
+            <a:ext cx="2920680" cy="1568160"/>
           </a:xfrm>
           <a:prstGeom prst="rect">
             <a:avLst/>
@@ -691,15 +700,15 @@
             <a:normAutofit/>
           </a:bodyPr>
           <a:p>
-            <a:endParaRPr b="0" lang="en-US" sz="2000" spc="-1" strike="noStrike">
-              <a:latin typeface="Arial"/>
-            </a:endParaRPr>
-          </a:p>
-        </p:txBody>
-      </p:sp>
-      <p:sp>
-        <p:nvSpPr>
-          <p:cNvPr id="42" name="PlaceHolder 5"/>
+            <a:endParaRPr b="0" lang="en-US" sz="3200" spc="-1" strike="noStrike">
+              <a:latin typeface="Arial"/>
+            </a:endParaRPr>
+          </a:p>
+        </p:txBody>
+      </p:sp>
+      <p:sp>
+        <p:nvSpPr>
+          <p:cNvPr id="38" name="PlaceHolder 5"/>
           <p:cNvSpPr>
             <a:spLocks noGrp="1"/>
           </p:cNvSpPr>
@@ -709,8 +718,8 @@
         </p:nvSpPr>
         <p:spPr>
           <a:xfrm>
-            <a:off x="540000" y="3230280"/>
-            <a:ext cx="2897640" cy="1716840"/>
+            <a:off x="504000" y="3044160"/>
+            <a:ext cx="2920680" cy="1568160"/>
           </a:xfrm>
           <a:prstGeom prst="rect">
             <a:avLst/>
@@ -725,15 +734,15 @@
             <a:normAutofit/>
           </a:bodyPr>
           <a:p>
-            <a:endParaRPr b="0" lang="en-US" sz="2000" spc="-1" strike="noStrike">
-              <a:latin typeface="Arial"/>
-            </a:endParaRPr>
-          </a:p>
-        </p:txBody>
-      </p:sp>
-      <p:sp>
-        <p:nvSpPr>
-          <p:cNvPr id="43" name="PlaceHolder 6"/>
+            <a:endParaRPr b="0" lang="en-US" sz="3200" spc="-1" strike="noStrike">
+              <a:latin typeface="Arial"/>
+            </a:endParaRPr>
+          </a:p>
+        </p:txBody>
+      </p:sp>
+      <p:sp>
+        <p:nvSpPr>
+          <p:cNvPr id="39" name="PlaceHolder 6"/>
           <p:cNvSpPr>
             <a:spLocks noGrp="1"/>
           </p:cNvSpPr>
@@ -743,8 +752,8 @@
         </p:nvSpPr>
         <p:spPr>
           <a:xfrm>
-            <a:off x="3583080" y="3230280"/>
-            <a:ext cx="2897640" cy="1716840"/>
+            <a:off x="3571200" y="3044160"/>
+            <a:ext cx="2920680" cy="1568160"/>
           </a:xfrm>
           <a:prstGeom prst="rect">
             <a:avLst/>
@@ -759,15 +768,15 @@
             <a:normAutofit/>
           </a:bodyPr>
           <a:p>
-            <a:endParaRPr b="0" lang="en-US" sz="2000" spc="-1" strike="noStrike">
-              <a:latin typeface="Arial"/>
-            </a:endParaRPr>
-          </a:p>
-        </p:txBody>
-      </p:sp>
-      <p:sp>
-        <p:nvSpPr>
-          <p:cNvPr id="44" name="PlaceHolder 7"/>
+            <a:endParaRPr b="0" lang="en-US" sz="3200" spc="-1" strike="noStrike">
+              <a:latin typeface="Arial"/>
+            </a:endParaRPr>
+          </a:p>
+        </p:txBody>
+      </p:sp>
+      <p:sp>
+        <p:nvSpPr>
+          <p:cNvPr id="40" name="PlaceHolder 7"/>
           <p:cNvSpPr>
             <a:spLocks noGrp="1"/>
           </p:cNvSpPr>
@@ -777,8 +786,8 @@
         </p:nvSpPr>
         <p:spPr>
           <a:xfrm>
-            <a:off x="6625800" y="3230280"/>
-            <a:ext cx="2897640" cy="1716840"/>
+            <a:off x="6638040" y="3044160"/>
+            <a:ext cx="2920680" cy="1568160"/>
           </a:xfrm>
           <a:prstGeom prst="rect">
             <a:avLst/>
@@ -793,7 +802,7 @@
             <a:normAutofit/>
           </a:bodyPr>
           <a:p>
-            <a:endParaRPr b="0" lang="en-US" sz="2000" spc="-1" strike="noStrike">
+            <a:endParaRPr b="0" lang="en-US" sz="3200" spc="-1" strike="noStrike">
               <a:latin typeface="Arial"/>
             </a:endParaRPr>
           </a:p>
@@ -833,7 +842,7 @@
         <p:txBody>
           <a:bodyPr/>
           <a:p>
-            <a:fld id="{EEBAA522-0F88-4545-9F24-4D07E8DDC4F6}" type="slidenum">
+            <a:fld id="{562ACCE1-DD0B-4CA1-B119-093F38F7AB56}" type="slidenum">
               <a:t>&lt;#&gt;</a:t>
             </a:fld>
           </a:p>
@@ -884,7 +893,7 @@
       </p:grpSpPr>
       <p:sp>
         <p:nvSpPr>
-          <p:cNvPr id="9" name="PlaceHolder 1"/>
+          <p:cNvPr id="5" name="PlaceHolder 1"/>
           <p:cNvSpPr>
             <a:spLocks noGrp="1"/>
           </p:cNvSpPr>
@@ -894,8 +903,8 @@
         </p:nvSpPr>
         <p:spPr>
           <a:xfrm>
-            <a:off x="540000" y="450000"/>
-            <a:ext cx="8640000" cy="630000"/>
+            <a:off x="504000" y="226080"/>
+            <a:ext cx="9071640" cy="946440"/>
           </a:xfrm>
           <a:prstGeom prst="rect">
             <a:avLst/>
@@ -910,15 +919,18 @@
             <a:noAutofit/>
           </a:bodyPr>
           <a:p>
-            <a:endParaRPr b="0" lang="en-US" sz="2700" spc="-1" strike="noStrike">
-              <a:latin typeface="Arial"/>
-            </a:endParaRPr>
-          </a:p>
-        </p:txBody>
-      </p:sp>
-      <p:sp>
-        <p:nvSpPr>
-          <p:cNvPr id="10" name="PlaceHolder 2"/>
+            <a:pPr algn="ctr">
+              <a:buNone/>
+            </a:pPr>
+            <a:endParaRPr b="0" lang="en-US" sz="4400" spc="-1" strike="noStrike">
+              <a:latin typeface="Arial"/>
+            </a:endParaRPr>
+          </a:p>
+        </p:txBody>
+      </p:sp>
+      <p:sp>
+        <p:nvSpPr>
+          <p:cNvPr id="6" name="PlaceHolder 2"/>
           <p:cNvSpPr>
             <a:spLocks noGrp="1"/>
           </p:cNvSpPr>
@@ -928,8 +940,8 @@
         </p:nvSpPr>
         <p:spPr>
           <a:xfrm>
-            <a:off x="540000" y="1350000"/>
-            <a:ext cx="9000000" cy="3600000"/>
+            <a:off x="504000" y="1326600"/>
+            <a:ext cx="9071640" cy="3288240"/>
           </a:xfrm>
           <a:prstGeom prst="rect">
             <a:avLst/>
@@ -987,7 +999,7 @@
         <p:txBody>
           <a:bodyPr/>
           <a:p>
-            <a:fld id="{45448E57-0204-44C9-BB17-28760994C7D1}" type="slidenum">
+            <a:fld id="{94640762-6C85-4460-9A34-92307413414B}" type="slidenum">
               <a:t>&lt;#&gt;</a:t>
             </a:fld>
           </a:p>
@@ -1038,7 +1050,7 @@
       </p:grpSpPr>
       <p:sp>
         <p:nvSpPr>
-          <p:cNvPr id="11" name="PlaceHolder 1"/>
+          <p:cNvPr id="7" name="PlaceHolder 1"/>
           <p:cNvSpPr>
             <a:spLocks noGrp="1"/>
           </p:cNvSpPr>
@@ -1048,8 +1060,8 @@
         </p:nvSpPr>
         <p:spPr>
           <a:xfrm>
-            <a:off x="540000" y="450000"/>
-            <a:ext cx="8640000" cy="630000"/>
+            <a:off x="504000" y="226080"/>
+            <a:ext cx="9071640" cy="946440"/>
           </a:xfrm>
           <a:prstGeom prst="rect">
             <a:avLst/>
@@ -1064,15 +1076,18 @@
             <a:noAutofit/>
           </a:bodyPr>
           <a:p>
-            <a:endParaRPr b="0" lang="en-US" sz="2700" spc="-1" strike="noStrike">
-              <a:latin typeface="Arial"/>
-            </a:endParaRPr>
-          </a:p>
-        </p:txBody>
-      </p:sp>
-      <p:sp>
-        <p:nvSpPr>
-          <p:cNvPr id="12" name="PlaceHolder 2"/>
+            <a:pPr algn="ctr">
+              <a:buNone/>
+            </a:pPr>
+            <a:endParaRPr b="0" lang="en-US" sz="4400" spc="-1" strike="noStrike">
+              <a:latin typeface="Arial"/>
+            </a:endParaRPr>
+          </a:p>
+        </p:txBody>
+      </p:sp>
+      <p:sp>
+        <p:nvSpPr>
+          <p:cNvPr id="8" name="PlaceHolder 2"/>
           <p:cNvSpPr>
             <a:spLocks noGrp="1"/>
           </p:cNvSpPr>
@@ -1082,8 +1097,8 @@
         </p:nvSpPr>
         <p:spPr>
           <a:xfrm>
-            <a:off x="540000" y="1350000"/>
-            <a:ext cx="9000000" cy="3600000"/>
+            <a:off x="504000" y="1326600"/>
+            <a:ext cx="9071640" cy="3288240"/>
           </a:xfrm>
           <a:prstGeom prst="rect">
             <a:avLst/>
@@ -1098,7 +1113,7 @@
             <a:normAutofit/>
           </a:bodyPr>
           <a:p>
-            <a:endParaRPr b="0" lang="en-US" sz="2000" spc="-1" strike="noStrike">
+            <a:endParaRPr b="0" lang="en-US" sz="3200" spc="-1" strike="noStrike">
               <a:latin typeface="Arial"/>
             </a:endParaRPr>
           </a:p>
@@ -1138,7 +1153,7 @@
         <p:txBody>
           <a:bodyPr/>
           <a:p>
-            <a:fld id="{5E8FFD80-3410-47D8-B42E-ACBE57817CD4}" type="slidenum">
+            <a:fld id="{1308383E-A61C-4E41-8D0E-F59790E8E9A5}" type="slidenum">
               <a:t>&lt;#&gt;</a:t>
             </a:fld>
           </a:p>
@@ -1189,7 +1204,7 @@
       </p:grpSpPr>
       <p:sp>
         <p:nvSpPr>
-          <p:cNvPr id="13" name="PlaceHolder 1"/>
+          <p:cNvPr id="9" name="PlaceHolder 1"/>
           <p:cNvSpPr>
             <a:spLocks noGrp="1"/>
           </p:cNvSpPr>
@@ -1199,8 +1214,8 @@
         </p:nvSpPr>
         <p:spPr>
           <a:xfrm>
-            <a:off x="540000" y="450000"/>
-            <a:ext cx="8640000" cy="630000"/>
+            <a:off x="504000" y="226080"/>
+            <a:ext cx="9071640" cy="946440"/>
           </a:xfrm>
           <a:prstGeom prst="rect">
             <a:avLst/>
@@ -1215,15 +1230,18 @@
             <a:noAutofit/>
           </a:bodyPr>
           <a:p>
-            <a:endParaRPr b="0" lang="en-US" sz="2700" spc="-1" strike="noStrike">
-              <a:latin typeface="Arial"/>
-            </a:endParaRPr>
-          </a:p>
-        </p:txBody>
-      </p:sp>
-      <p:sp>
-        <p:nvSpPr>
-          <p:cNvPr id="14" name="PlaceHolder 2"/>
+            <a:pPr algn="ctr">
+              <a:buNone/>
+            </a:pPr>
+            <a:endParaRPr b="0" lang="en-US" sz="4400" spc="-1" strike="noStrike">
+              <a:latin typeface="Arial"/>
+            </a:endParaRPr>
+          </a:p>
+        </p:txBody>
+      </p:sp>
+      <p:sp>
+        <p:nvSpPr>
+          <p:cNvPr id="10" name="PlaceHolder 2"/>
           <p:cNvSpPr>
             <a:spLocks noGrp="1"/>
           </p:cNvSpPr>
@@ -1233,8 +1251,8 @@
         </p:nvSpPr>
         <p:spPr>
           <a:xfrm>
-            <a:off x="540000" y="1350000"/>
-            <a:ext cx="4391640" cy="3600000"/>
+            <a:off x="504000" y="1326600"/>
+            <a:ext cx="4426920" cy="3288240"/>
           </a:xfrm>
           <a:prstGeom prst="rect">
             <a:avLst/>
@@ -1249,15 +1267,15 @@
             <a:normAutofit/>
           </a:bodyPr>
           <a:p>
-            <a:endParaRPr b="0" lang="en-US" sz="2000" spc="-1" strike="noStrike">
-              <a:latin typeface="Arial"/>
-            </a:endParaRPr>
-          </a:p>
-        </p:txBody>
-      </p:sp>
-      <p:sp>
-        <p:nvSpPr>
-          <p:cNvPr id="15" name="PlaceHolder 3"/>
+            <a:endParaRPr b="0" lang="en-US" sz="3200" spc="-1" strike="noStrike">
+              <a:latin typeface="Arial"/>
+            </a:endParaRPr>
+          </a:p>
+        </p:txBody>
+      </p:sp>
+      <p:sp>
+        <p:nvSpPr>
+          <p:cNvPr id="11" name="PlaceHolder 3"/>
           <p:cNvSpPr>
             <a:spLocks noGrp="1"/>
           </p:cNvSpPr>
@@ -1267,8 +1285,8 @@
         </p:nvSpPr>
         <p:spPr>
           <a:xfrm>
-            <a:off x="5151600" y="1350000"/>
-            <a:ext cx="4391640" cy="3600000"/>
+            <a:off x="5152680" y="1326600"/>
+            <a:ext cx="4426920" cy="3288240"/>
           </a:xfrm>
           <a:prstGeom prst="rect">
             <a:avLst/>
@@ -1283,7 +1301,7 @@
             <a:normAutofit/>
           </a:bodyPr>
           <a:p>
-            <a:endParaRPr b="0" lang="en-US" sz="2000" spc="-1" strike="noStrike">
+            <a:endParaRPr b="0" lang="en-US" sz="3200" spc="-1" strike="noStrike">
               <a:latin typeface="Arial"/>
             </a:endParaRPr>
           </a:p>
@@ -1323,7 +1341,7 @@
         <p:txBody>
           <a:bodyPr/>
           <a:p>
-            <a:fld id="{35DA1965-A307-4093-9567-9BB080C62F39}" type="slidenum">
+            <a:fld id="{716F91C0-B73E-4FCB-92BA-321568A3E297}" type="slidenum">
               <a:t>&lt;#&gt;</a:t>
             </a:fld>
           </a:p>
@@ -1374,7 +1392,7 @@
       </p:grpSpPr>
       <p:sp>
         <p:nvSpPr>
-          <p:cNvPr id="16" name="PlaceHolder 1"/>
+          <p:cNvPr id="12" name="PlaceHolder 1"/>
           <p:cNvSpPr>
             <a:spLocks noGrp="1"/>
           </p:cNvSpPr>
@@ -1384,8 +1402,8 @@
         </p:nvSpPr>
         <p:spPr>
           <a:xfrm>
-            <a:off x="540000" y="450000"/>
-            <a:ext cx="8640000" cy="630000"/>
+            <a:off x="504000" y="226080"/>
+            <a:ext cx="9071640" cy="946440"/>
           </a:xfrm>
           <a:prstGeom prst="rect">
             <a:avLst/>
@@ -1400,7 +1418,10 @@
             <a:noAutofit/>
           </a:bodyPr>
           <a:p>
-            <a:endParaRPr b="0" lang="en-US" sz="2700" spc="-1" strike="noStrike">
+            <a:pPr algn="ctr">
+              <a:buNone/>
+            </a:pPr>
+            <a:endParaRPr b="0" lang="en-US" sz="4400" spc="-1" strike="noStrike">
               <a:latin typeface="Arial"/>
             </a:endParaRPr>
           </a:p>
@@ -1440,7 +1461,7 @@
         <p:txBody>
           <a:bodyPr/>
           <a:p>
-            <a:fld id="{777FBC14-56E8-4D7C-A67E-7EBFE38C6F8B}" type="slidenum">
+            <a:fld id="{3739F568-BD21-4203-96C9-ACFB84D57F87}" type="slidenum">
               <a:t>&lt;#&gt;</a:t>
             </a:fld>
           </a:p>
@@ -1491,7 +1512,7 @@
       </p:grpSpPr>
       <p:sp>
         <p:nvSpPr>
-          <p:cNvPr id="17" name="PlaceHolder 1"/>
+          <p:cNvPr id="13" name="PlaceHolder 1"/>
           <p:cNvSpPr>
             <a:spLocks noGrp="1"/>
           </p:cNvSpPr>
@@ -1501,8 +1522,8 @@
         </p:nvSpPr>
         <p:spPr>
           <a:xfrm>
-            <a:off x="540000" y="450000"/>
-            <a:ext cx="8640000" cy="2921760"/>
+            <a:off x="504000" y="226080"/>
+            <a:ext cx="9071640" cy="4388400"/>
           </a:xfrm>
           <a:prstGeom prst="rect">
             <a:avLst/>
@@ -1560,7 +1581,7 @@
         <p:txBody>
           <a:bodyPr/>
           <a:p>
-            <a:fld id="{585FE99C-D048-41B3-9435-A22B2144AF38}" type="slidenum">
+            <a:fld id="{3FF47B5B-22F2-450C-8505-0148752B0D56}" type="slidenum">
               <a:t>&lt;#&gt;</a:t>
             </a:fld>
           </a:p>
@@ -1611,7 +1632,7 @@
       </p:grpSpPr>
       <p:sp>
         <p:nvSpPr>
-          <p:cNvPr id="18" name="PlaceHolder 1"/>
+          <p:cNvPr id="14" name="PlaceHolder 1"/>
           <p:cNvSpPr>
             <a:spLocks noGrp="1"/>
           </p:cNvSpPr>
@@ -1621,8 +1642,8 @@
         </p:nvSpPr>
         <p:spPr>
           <a:xfrm>
-            <a:off x="540000" y="450000"/>
-            <a:ext cx="8640000" cy="630000"/>
+            <a:off x="504000" y="226080"/>
+            <a:ext cx="9071640" cy="946440"/>
           </a:xfrm>
           <a:prstGeom prst="rect">
             <a:avLst/>
@@ -1637,15 +1658,18 @@
             <a:noAutofit/>
           </a:bodyPr>
           <a:p>
-            <a:endParaRPr b="0" lang="en-US" sz="2700" spc="-1" strike="noStrike">
-              <a:latin typeface="Arial"/>
-            </a:endParaRPr>
-          </a:p>
-        </p:txBody>
-      </p:sp>
-      <p:sp>
-        <p:nvSpPr>
-          <p:cNvPr id="19" name="PlaceHolder 2"/>
+            <a:pPr algn="ctr">
+              <a:buNone/>
+            </a:pPr>
+            <a:endParaRPr b="0" lang="en-US" sz="4400" spc="-1" strike="noStrike">
+              <a:latin typeface="Arial"/>
+            </a:endParaRPr>
+          </a:p>
+        </p:txBody>
+      </p:sp>
+      <p:sp>
+        <p:nvSpPr>
+          <p:cNvPr id="15" name="PlaceHolder 2"/>
           <p:cNvSpPr>
             <a:spLocks noGrp="1"/>
           </p:cNvSpPr>
@@ -1655,8 +1679,8 @@
         </p:nvSpPr>
         <p:spPr>
           <a:xfrm>
-            <a:off x="540000" y="1350000"/>
-            <a:ext cx="4391640" cy="1716840"/>
+            <a:off x="504000" y="1326600"/>
+            <a:ext cx="4426920" cy="1568160"/>
           </a:xfrm>
           <a:prstGeom prst="rect">
             <a:avLst/>
@@ -1671,15 +1695,15 @@
             <a:normAutofit/>
           </a:bodyPr>
           <a:p>
-            <a:endParaRPr b="0" lang="en-US" sz="2000" spc="-1" strike="noStrike">
-              <a:latin typeface="Arial"/>
-            </a:endParaRPr>
-          </a:p>
-        </p:txBody>
-      </p:sp>
-      <p:sp>
-        <p:nvSpPr>
-          <p:cNvPr id="20" name="PlaceHolder 3"/>
+            <a:endParaRPr b="0" lang="en-US" sz="3200" spc="-1" strike="noStrike">
+              <a:latin typeface="Arial"/>
+            </a:endParaRPr>
+          </a:p>
+        </p:txBody>
+      </p:sp>
+      <p:sp>
+        <p:nvSpPr>
+          <p:cNvPr id="16" name="PlaceHolder 3"/>
           <p:cNvSpPr>
             <a:spLocks noGrp="1"/>
           </p:cNvSpPr>
@@ -1689,8 +1713,8 @@
         </p:nvSpPr>
         <p:spPr>
           <a:xfrm>
-            <a:off x="5151600" y="1350000"/>
-            <a:ext cx="4391640" cy="3600000"/>
+            <a:off x="5152680" y="1326600"/>
+            <a:ext cx="4426920" cy="3288240"/>
           </a:xfrm>
           <a:prstGeom prst="rect">
             <a:avLst/>
@@ -1705,15 +1729,15 @@
             <a:normAutofit/>
           </a:bodyPr>
           <a:p>
-            <a:endParaRPr b="0" lang="en-US" sz="2000" spc="-1" strike="noStrike">
-              <a:latin typeface="Arial"/>
-            </a:endParaRPr>
-          </a:p>
-        </p:txBody>
-      </p:sp>
-      <p:sp>
-        <p:nvSpPr>
-          <p:cNvPr id="21" name="PlaceHolder 4"/>
+            <a:endParaRPr b="0" lang="en-US" sz="3200" spc="-1" strike="noStrike">
+              <a:latin typeface="Arial"/>
+            </a:endParaRPr>
+          </a:p>
+        </p:txBody>
+      </p:sp>
+      <p:sp>
+        <p:nvSpPr>
+          <p:cNvPr id="17" name="PlaceHolder 4"/>
           <p:cNvSpPr>
             <a:spLocks noGrp="1"/>
           </p:cNvSpPr>
@@ -1723,8 +1747,8 @@
         </p:nvSpPr>
         <p:spPr>
           <a:xfrm>
-            <a:off x="540000" y="3230280"/>
-            <a:ext cx="4391640" cy="1716840"/>
+            <a:off x="504000" y="3044160"/>
+            <a:ext cx="4426920" cy="1568160"/>
           </a:xfrm>
           <a:prstGeom prst="rect">
             <a:avLst/>
@@ -1739,7 +1763,7 @@
             <a:normAutofit/>
           </a:bodyPr>
           <a:p>
-            <a:endParaRPr b="0" lang="en-US" sz="2000" spc="-1" strike="noStrike">
+            <a:endParaRPr b="0" lang="en-US" sz="3200" spc="-1" strike="noStrike">
               <a:latin typeface="Arial"/>
             </a:endParaRPr>
           </a:p>
@@ -1779,7 +1803,7 @@
         <p:txBody>
           <a:bodyPr/>
           <a:p>
-            <a:fld id="{C84711F4-8B6C-441C-AE18-AD0A46DC57CF}" type="slidenum">
+            <a:fld id="{8CA09FB6-7F00-42BD-AED6-4CDE877AC921}" type="slidenum">
               <a:t>&lt;#&gt;</a:t>
             </a:fld>
           </a:p>
@@ -1830,7 +1854,7 @@
       </p:grpSpPr>
       <p:sp>
         <p:nvSpPr>
-          <p:cNvPr id="22" name="PlaceHolder 1"/>
+          <p:cNvPr id="18" name="PlaceHolder 1"/>
           <p:cNvSpPr>
             <a:spLocks noGrp="1"/>
           </p:cNvSpPr>
@@ -1840,8 +1864,8 @@
         </p:nvSpPr>
         <p:spPr>
           <a:xfrm>
-            <a:off x="540000" y="450000"/>
-            <a:ext cx="8640000" cy="630000"/>
+            <a:off x="504000" y="226080"/>
+            <a:ext cx="9071640" cy="946440"/>
           </a:xfrm>
           <a:prstGeom prst="rect">
             <a:avLst/>
@@ -1856,15 +1880,18 @@
             <a:noAutofit/>
           </a:bodyPr>
           <a:p>
-            <a:endParaRPr b="0" lang="en-US" sz="2700" spc="-1" strike="noStrike">
-              <a:latin typeface="Arial"/>
-            </a:endParaRPr>
-          </a:p>
-        </p:txBody>
-      </p:sp>
-      <p:sp>
-        <p:nvSpPr>
-          <p:cNvPr id="23" name="PlaceHolder 2"/>
+            <a:pPr algn="ctr">
+              <a:buNone/>
+            </a:pPr>
+            <a:endParaRPr b="0" lang="en-US" sz="4400" spc="-1" strike="noStrike">
+              <a:latin typeface="Arial"/>
+            </a:endParaRPr>
+          </a:p>
+        </p:txBody>
+      </p:sp>
+      <p:sp>
+        <p:nvSpPr>
+          <p:cNvPr id="19" name="PlaceHolder 2"/>
           <p:cNvSpPr>
             <a:spLocks noGrp="1"/>
           </p:cNvSpPr>
@@ -1874,8 +1901,8 @@
         </p:nvSpPr>
         <p:spPr>
           <a:xfrm>
-            <a:off x="540000" y="1350000"/>
-            <a:ext cx="4391640" cy="3600000"/>
+            <a:off x="504000" y="1326600"/>
+            <a:ext cx="4426920" cy="3288240"/>
           </a:xfrm>
           <a:prstGeom prst="rect">
             <a:avLst/>
@@ -1890,15 +1917,15 @@
             <a:normAutofit/>
           </a:bodyPr>
           <a:p>
-            <a:endParaRPr b="0" lang="en-US" sz="2000" spc="-1" strike="noStrike">
-              <a:latin typeface="Arial"/>
-            </a:endParaRPr>
-          </a:p>
-        </p:txBody>
-      </p:sp>
-      <p:sp>
-        <p:nvSpPr>
-          <p:cNvPr id="24" name="PlaceHolder 3"/>
+            <a:endParaRPr b="0" lang="en-US" sz="3200" spc="-1" strike="noStrike">
+              <a:latin typeface="Arial"/>
+            </a:endParaRPr>
+          </a:p>
+        </p:txBody>
+      </p:sp>
+      <p:sp>
+        <p:nvSpPr>
+          <p:cNvPr id="20" name="PlaceHolder 3"/>
           <p:cNvSpPr>
             <a:spLocks noGrp="1"/>
           </p:cNvSpPr>
@@ -1908,8 +1935,8 @@
         </p:nvSpPr>
         <p:spPr>
           <a:xfrm>
-            <a:off x="5151600" y="1350000"/>
-            <a:ext cx="4391640" cy="1716840"/>
+            <a:off x="5152680" y="1326600"/>
+            <a:ext cx="4426920" cy="1568160"/>
           </a:xfrm>
           <a:prstGeom prst="rect">
             <a:avLst/>
@@ -1924,15 +1951,15 @@
             <a:normAutofit/>
           </a:bodyPr>
           <a:p>
-            <a:endParaRPr b="0" lang="en-US" sz="2000" spc="-1" strike="noStrike">
-              <a:latin typeface="Arial"/>
-            </a:endParaRPr>
-          </a:p>
-        </p:txBody>
-      </p:sp>
-      <p:sp>
-        <p:nvSpPr>
-          <p:cNvPr id="25" name="PlaceHolder 4"/>
+            <a:endParaRPr b="0" lang="en-US" sz="3200" spc="-1" strike="noStrike">
+              <a:latin typeface="Arial"/>
+            </a:endParaRPr>
+          </a:p>
+        </p:txBody>
+      </p:sp>
+      <p:sp>
+        <p:nvSpPr>
+          <p:cNvPr id="21" name="PlaceHolder 4"/>
           <p:cNvSpPr>
             <a:spLocks noGrp="1"/>
           </p:cNvSpPr>
@@ -1942,8 +1969,8 @@
         </p:nvSpPr>
         <p:spPr>
           <a:xfrm>
-            <a:off x="5151600" y="3230280"/>
-            <a:ext cx="4391640" cy="1716840"/>
+            <a:off x="5152680" y="3044160"/>
+            <a:ext cx="4426920" cy="1568160"/>
           </a:xfrm>
           <a:prstGeom prst="rect">
             <a:avLst/>
@@ -1958,7 +1985,7 @@
             <a:normAutofit/>
           </a:bodyPr>
           <a:p>
-            <a:endParaRPr b="0" lang="en-US" sz="2000" spc="-1" strike="noStrike">
+            <a:endParaRPr b="0" lang="en-US" sz="3200" spc="-1" strike="noStrike">
               <a:latin typeface="Arial"/>
             </a:endParaRPr>
           </a:p>
@@ -1998,7 +2025,7 @@
         <p:txBody>
           <a:bodyPr/>
           <a:p>
-            <a:fld id="{9A8B70E2-6B29-443A-9086-A80666B1131B}" type="slidenum">
+            <a:fld id="{340B0A61-6C81-4BF9-97E9-0CE58E0D4445}" type="slidenum">
               <a:t>&lt;#&gt;</a:t>
             </a:fld>
           </a:p>
@@ -2049,7 +2076,7 @@
       </p:grpSpPr>
       <p:sp>
         <p:nvSpPr>
-          <p:cNvPr id="26" name="PlaceHolder 1"/>
+          <p:cNvPr id="22" name="PlaceHolder 1"/>
           <p:cNvSpPr>
             <a:spLocks noGrp="1"/>
           </p:cNvSpPr>
@@ -2059,8 +2086,8 @@
         </p:nvSpPr>
         <p:spPr>
           <a:xfrm>
-            <a:off x="540000" y="450000"/>
-            <a:ext cx="8640000" cy="630000"/>
+            <a:off x="504000" y="226080"/>
+            <a:ext cx="9071640" cy="946440"/>
           </a:xfrm>
           <a:prstGeom prst="rect">
             <a:avLst/>
@@ -2075,15 +2102,18 @@
             <a:noAutofit/>
           </a:bodyPr>
           <a:p>
-            <a:endParaRPr b="0" lang="en-US" sz="2700" spc="-1" strike="noStrike">
-              <a:latin typeface="Arial"/>
-            </a:endParaRPr>
-          </a:p>
-        </p:txBody>
-      </p:sp>
-      <p:sp>
-        <p:nvSpPr>
-          <p:cNvPr id="27" name="PlaceHolder 2"/>
+            <a:pPr algn="ctr">
+              <a:buNone/>
+            </a:pPr>
+            <a:endParaRPr b="0" lang="en-US" sz="4400" spc="-1" strike="noStrike">
+              <a:latin typeface="Arial"/>
+            </a:endParaRPr>
+          </a:p>
+        </p:txBody>
+      </p:sp>
+      <p:sp>
+        <p:nvSpPr>
+          <p:cNvPr id="23" name="PlaceHolder 2"/>
           <p:cNvSpPr>
             <a:spLocks noGrp="1"/>
           </p:cNvSpPr>
@@ -2093,8 +2123,8 @@
         </p:nvSpPr>
         <p:spPr>
           <a:xfrm>
-            <a:off x="540000" y="1350000"/>
-            <a:ext cx="4391640" cy="1716840"/>
+            <a:off x="504000" y="1326600"/>
+            <a:ext cx="4426920" cy="1568160"/>
           </a:xfrm>
           <a:prstGeom prst="rect">
             <a:avLst/>
@@ -2109,15 +2139,15 @@
             <a:normAutofit/>
           </a:bodyPr>
           <a:p>
-            <a:endParaRPr b="0" lang="en-US" sz="2000" spc="-1" strike="noStrike">
-              <a:latin typeface="Arial"/>
-            </a:endParaRPr>
-          </a:p>
-        </p:txBody>
-      </p:sp>
-      <p:sp>
-        <p:nvSpPr>
-          <p:cNvPr id="28" name="PlaceHolder 3"/>
+            <a:endParaRPr b="0" lang="en-US" sz="3200" spc="-1" strike="noStrike">
+              <a:latin typeface="Arial"/>
+            </a:endParaRPr>
+          </a:p>
+        </p:txBody>
+      </p:sp>
+      <p:sp>
+        <p:nvSpPr>
+          <p:cNvPr id="24" name="PlaceHolder 3"/>
           <p:cNvSpPr>
             <a:spLocks noGrp="1"/>
           </p:cNvSpPr>
@@ -2127,8 +2157,8 @@
         </p:nvSpPr>
         <p:spPr>
           <a:xfrm>
-            <a:off x="5151600" y="1350000"/>
-            <a:ext cx="4391640" cy="1716840"/>
+            <a:off x="5152680" y="1326600"/>
+            <a:ext cx="4426920" cy="1568160"/>
           </a:xfrm>
           <a:prstGeom prst="rect">
             <a:avLst/>
@@ -2143,15 +2173,15 @@
             <a:normAutofit/>
           </a:bodyPr>
           <a:p>
-            <a:endParaRPr b="0" lang="en-US" sz="2000" spc="-1" strike="noStrike">
-              <a:latin typeface="Arial"/>
-            </a:endParaRPr>
-          </a:p>
-        </p:txBody>
-      </p:sp>
-      <p:sp>
-        <p:nvSpPr>
-          <p:cNvPr id="29" name="PlaceHolder 4"/>
+            <a:endParaRPr b="0" lang="en-US" sz="3200" spc="-1" strike="noStrike">
+              <a:latin typeface="Arial"/>
+            </a:endParaRPr>
+          </a:p>
+        </p:txBody>
+      </p:sp>
+      <p:sp>
+        <p:nvSpPr>
+          <p:cNvPr id="25" name="PlaceHolder 4"/>
           <p:cNvSpPr>
             <a:spLocks noGrp="1"/>
           </p:cNvSpPr>
@@ -2161,8 +2191,8 @@
         </p:nvSpPr>
         <p:spPr>
           <a:xfrm>
-            <a:off x="540000" y="3230280"/>
-            <a:ext cx="9000000" cy="1716840"/>
+            <a:off x="504000" y="3044160"/>
+            <a:ext cx="9071640" cy="1568160"/>
           </a:xfrm>
           <a:prstGeom prst="rect">
             <a:avLst/>
@@ -2177,7 +2207,7 @@
             <a:normAutofit/>
           </a:bodyPr>
           <a:p>
-            <a:endParaRPr b="0" lang="en-US" sz="2000" spc="-1" strike="noStrike">
+            <a:endParaRPr b="0" lang="en-US" sz="3200" spc="-1" strike="noStrike">
               <a:latin typeface="Arial"/>
             </a:endParaRPr>
           </a:p>
@@ -2217,7 +2247,7 @@
         <p:txBody>
           <a:bodyPr/>
           <a:p>
-            <a:fld id="{B9A66849-21DF-41E1-B279-E13A294399FB}" type="slidenum">
+            <a:fld id="{679E7345-02E9-487F-8F71-7161F9FF51B4}" type="slidenum">
               <a:t>&lt;#&gt;</a:t>
             </a:fld>
           </a:p>
@@ -2268,63 +2298,50 @@
       </p:grpSpPr>
       <p:sp>
         <p:nvSpPr>
-          <p:cNvPr id="0" name=""/>
-          <p:cNvSpPr/>
-          <p:nvPr/>
-        </p:nvSpPr>
-        <p:spPr>
-          <a:xfrm>
-            <a:off x="0" y="0"/>
-            <a:ext cx="10080000" cy="5669640"/>
-          </a:xfrm>
-          <a:prstGeom prst="rect">
-            <a:avLst/>
-          </a:prstGeom>
-          <a:solidFill>
-            <a:srgbClr val="666666"/>
-          </a:solidFill>
-          <a:ln w="0">
-            <a:noFill/>
-          </a:ln>
-        </p:spPr>
-        <p:style>
-          <a:lnRef idx="0"/>
-          <a:fillRef idx="0"/>
-          <a:effectRef idx="0"/>
-          <a:fontRef idx="minor"/>
-        </p:style>
-      </p:sp>
-      <p:sp>
-        <p:nvSpPr>
-          <p:cNvPr id="1" name=""/>
-          <p:cNvSpPr/>
-          <p:nvPr/>
-        </p:nvSpPr>
-        <p:spPr>
-          <a:xfrm>
-            <a:off x="270000" y="180000"/>
-            <a:ext cx="9540000" cy="4860000"/>
-          </a:xfrm>
-          <a:prstGeom prst="rect">
-            <a:avLst/>
-          </a:prstGeom>
-          <a:solidFill>
-            <a:srgbClr val="ffffff"/>
-          </a:solidFill>
-          <a:ln w="0">
-            <a:noFill/>
-          </a:ln>
-        </p:spPr>
-        <p:style>
-          <a:lnRef idx="0"/>
-          <a:fillRef idx="0"/>
-          <a:effectRef idx="0"/>
-          <a:fontRef idx="minor"/>
-        </p:style>
-      </p:sp>
-      <p:sp>
-        <p:nvSpPr>
-          <p:cNvPr id="2" name="PlaceHolder 1"/>
+          <p:cNvPr id="0" name="PlaceHolder 1"/>
+          <p:cNvSpPr>
+            <a:spLocks noGrp="1"/>
+          </p:cNvSpPr>
+          <p:nvPr>
+            <p:ph type="title"/>
+          </p:nvPr>
+        </p:nvSpPr>
+        <p:spPr>
+          <a:xfrm>
+            <a:off x="504000" y="226080"/>
+            <a:ext cx="9071640" cy="946440"/>
+          </a:xfrm>
+          <a:prstGeom prst="rect">
+            <a:avLst/>
+          </a:prstGeom>
+          <a:noFill/>
+          <a:ln w="0">
+            <a:noFill/>
+          </a:ln>
+        </p:spPr>
+        <p:txBody>
+          <a:bodyPr lIns="0" rIns="0" tIns="0" bIns="0" anchor="ctr">
+            <a:noAutofit/>
+          </a:bodyPr>
+          <a:p>
+            <a:pPr algn="ctr">
+              <a:buNone/>
+            </a:pPr>
+            <a:r>
+              <a:rPr b="0" lang="en-US" sz="4400" spc="-1" strike="noStrike">
+                <a:latin typeface="Arial"/>
+              </a:rPr>
+              <a:t>Click to edit the title text format</a:t>
+            </a:r>
+            <a:endParaRPr b="0" lang="en-US" sz="4400" spc="-1" strike="noStrike">
+              <a:latin typeface="Arial"/>
+            </a:endParaRPr>
+          </a:p>
+        </p:txBody>
+      </p:sp>
+      <p:sp>
+        <p:nvSpPr>
+          <p:cNvPr id="1" name="PlaceHolder 2"/>
           <p:cNvSpPr>
             <a:spLocks noGrp="1"/>
           </p:cNvSpPr>
@@ -2334,8 +2351,8 @@
         </p:nvSpPr>
         <p:spPr>
           <a:xfrm>
-            <a:off x="540000" y="1350000"/>
-            <a:ext cx="9000000" cy="3600000"/>
+            <a:off x="504000" y="1326600"/>
+            <a:ext cx="9071640" cy="3288240"/>
           </a:xfrm>
           <a:prstGeom prst="rect">
             <a:avLst/>
@@ -2351,33 +2368,77 @@
           </a:bodyPr>
           <a:p>
             <a:pPr marL="432000" indent="-324000">
-              <a:spcAft>
-                <a:spcPts val="1057"/>
-              </a:spcAft>
+              <a:spcBef>
+                <a:spcPts val="1417"/>
+              </a:spcBef>
               <a:buClr>
-                <a:srgbClr val="91d93f"/>
+                <a:srgbClr val="000000"/>
               </a:buClr>
               <a:buSzPct val="45000"/>
               <a:buFont typeface="Wingdings" charset="2"/>
               <a:buChar char=""/>
             </a:pPr>
             <a:r>
-              <a:rPr b="0" lang="en-US" sz="2000" spc="-1" strike="noStrike">
+              <a:rPr b="0" lang="en-US" sz="3200" spc="-1" strike="noStrike">
                 <a:latin typeface="Arial"/>
               </a:rPr>
               <a:t>Click to edit the outline text format</a:t>
             </a:r>
-            <a:endParaRPr b="0" lang="en-US" sz="2000" spc="-1" strike="noStrike">
+            <a:endParaRPr b="0" lang="en-US" sz="3200" spc="-1" strike="noStrike">
               <a:latin typeface="Arial"/>
             </a:endParaRPr>
           </a:p>
           <a:p>
             <a:pPr lvl="1" marL="864000" indent="-324000">
-              <a:spcAft>
-                <a:spcPts val="845"/>
-              </a:spcAft>
+              <a:spcBef>
+                <a:spcPts val="1134"/>
+              </a:spcBef>
               <a:buClr>
-                <a:srgbClr val="91d93f"/>
+                <a:srgbClr val="000000"/>
+              </a:buClr>
+              <a:buSzPct val="75000"/>
+              <a:buFont typeface="Symbol" charset="2"/>
+              <a:buChar char=""/>
+            </a:pPr>
+            <a:r>
+              <a:rPr b="0" lang="en-US" sz="2800" spc="-1" strike="noStrike">
+                <a:latin typeface="Arial"/>
+              </a:rPr>
+              <a:t>Second Outline Level</a:t>
+            </a:r>
+            <a:endParaRPr b="0" lang="en-US" sz="2800" spc="-1" strike="noStrike">
+              <a:latin typeface="Arial"/>
+            </a:endParaRPr>
+          </a:p>
+          <a:p>
+            <a:pPr lvl="2" marL="1296000" indent="-288000">
+              <a:spcBef>
+                <a:spcPts val="850"/>
+              </a:spcBef>
+              <a:buClr>
+                <a:srgbClr val="000000"/>
+              </a:buClr>
+              <a:buSzPct val="45000"/>
+              <a:buFont typeface="Wingdings" charset="2"/>
+              <a:buChar char=""/>
+            </a:pPr>
+            <a:r>
+              <a:rPr b="0" lang="en-US" sz="2400" spc="-1" strike="noStrike">
+                <a:latin typeface="Arial"/>
+              </a:rPr>
+              <a:t>Third Outline Level</a:t>
+            </a:r>
+            <a:endParaRPr b="0" lang="en-US" sz="2400" spc="-1" strike="noStrike">
+              <a:latin typeface="Arial"/>
+            </a:endParaRPr>
+          </a:p>
+          <a:p>
+            <a:pPr lvl="3" marL="1728000" indent="-216000">
+              <a:spcBef>
+                <a:spcPts val="567"/>
+              </a:spcBef>
+              <a:buClr>
+                <a:srgbClr val="000000"/>
               </a:buClr>
               <a:buSzPct val="75000"/>
               <a:buFont typeface="Symbol" charset="2"/>
@@ -2387,50 +2448,6 @@
               <a:rPr b="0" lang="en-US" sz="2000" spc="-1" strike="noStrike">
                 <a:latin typeface="Arial"/>
               </a:rPr>
-              <a:t>Second Outline Level</a:t>
-            </a:r>
-            <a:endParaRPr b="0" lang="en-US" sz="2000" spc="-1" strike="noStrike">
-              <a:latin typeface="Arial"/>
-            </a:endParaRPr>
-          </a:p>
-          <a:p>
-            <a:pPr lvl="2" marL="1296000" indent="-288000">
-              <a:spcAft>
-                <a:spcPts val="632"/>
-              </a:spcAft>
-              <a:buClr>
-                <a:srgbClr val="91d93f"/>
-              </a:buClr>
-              <a:buSzPct val="45000"/>
-              <a:buFont typeface="Wingdings 2" charset="2"/>
-              <a:buChar char=""/>
-            </a:pPr>
-            <a:r>
-              <a:rPr b="0" lang="en-US" sz="2000" spc="-1" strike="noStrike">
-                <a:latin typeface="Arial"/>
-              </a:rPr>
-              <a:t>Third Outline Level</a:t>
-            </a:r>
-            <a:endParaRPr b="0" lang="en-US" sz="2000" spc="-1" strike="noStrike">
-              <a:latin typeface="Arial"/>
-            </a:endParaRPr>
-          </a:p>
-          <a:p>
-            <a:pPr lvl="3" marL="1728000" indent="-216000">
-              <a:spcAft>
-                <a:spcPts val="420"/>
-              </a:spcAft>
-              <a:buClr>
-                <a:srgbClr val="91d93f"/>
-              </a:buClr>
-              <a:buSzPct val="45000"/>
-              <a:buFont typeface="Wingdings" charset="2"/>
-              <a:buChar char=""/>
-            </a:pPr>
-            <a:r>
-              <a:rPr b="0" lang="en-US" sz="2000" spc="-1" strike="noStrike">
-                <a:latin typeface="Arial"/>
-              </a:rPr>
               <a:t>Fourth Outline Level</a:t>
             </a:r>
             <a:endParaRPr b="0" lang="en-US" sz="2000" spc="-1" strike="noStrike">
@@ -2439,11 +2456,11 @@
           </a:p>
           <a:p>
             <a:pPr lvl="4" marL="2160000" indent="-216000">
-              <a:spcAft>
-                <a:spcPts val="207"/>
-              </a:spcAft>
+              <a:spcBef>
+                <a:spcPts val="283"/>
+              </a:spcBef>
               <a:buClr>
-                <a:srgbClr val="91d93f"/>
+                <a:srgbClr val="000000"/>
               </a:buClr>
               <a:buSzPct val="45000"/>
               <a:buFont typeface="Wingdings" charset="2"/>
@@ -2461,11 +2478,11 @@
           </a:p>
           <a:p>
             <a:pPr lvl="5" marL="2592000" indent="-216000">
-              <a:spcAft>
-                <a:spcPts val="207"/>
-              </a:spcAft>
+              <a:spcBef>
+                <a:spcPts val="283"/>
+              </a:spcBef>
               <a:buClr>
-                <a:srgbClr val="91d93f"/>
+                <a:srgbClr val="000000"/>
               </a:buClr>
               <a:buSzPct val="45000"/>
               <a:buFont typeface="Wingdings" charset="2"/>
@@ -2483,11 +2500,11 @@
           </a:p>
           <a:p>
             <a:pPr lvl="6" marL="3024000" indent="-216000">
-              <a:spcAft>
-                <a:spcPts val="207"/>
-              </a:spcAft>
+              <a:spcBef>
+                <a:spcPts val="283"/>
+              </a:spcBef>
               <a:buClr>
-                <a:srgbClr val="91d93f"/>
+                <a:srgbClr val="000000"/>
               </a:buClr>
               <a:buSzPct val="45000"/>
               <a:buFont typeface="Wingdings" charset="2"/>
@@ -2507,119 +2524,7 @@
       </p:sp>
       <p:sp>
         <p:nvSpPr>
-          <p:cNvPr id="3" name=""/>
-          <p:cNvSpPr/>
-          <p:nvPr/>
-        </p:nvSpPr>
-        <p:spPr>
-          <a:xfrm>
-            <a:off x="7920000" y="90000"/>
-            <a:ext cx="900000" cy="1170000"/>
-          </a:xfrm>
-          <a:prstGeom prst="rect">
-            <a:avLst/>
-          </a:prstGeom>
-          <a:solidFill>
-            <a:srgbClr val="7d8ae7"/>
-          </a:solidFill>
-          <a:ln w="10800">
-            <a:solidFill>
-              <a:srgbClr val="3f52d9"/>
-            </a:solidFill>
-            <a:round/>
-          </a:ln>
-          <a:effectLst>
-            <a:outerShdw dist="30547" dir="2700000" blurRad="0" rotWithShape="0">
-              <a:srgbClr val="c1c7f4"/>
-            </a:outerShdw>
-          </a:effectLst>
-        </p:spPr>
-        <p:style>
-          <a:lnRef idx="0"/>
-          <a:fillRef idx="0"/>
-          <a:effectRef idx="0"/>
-          <a:fontRef idx="minor"/>
-        </p:style>
-      </p:sp>
-      <p:sp>
-        <p:nvSpPr>
-          <p:cNvPr id="4" name=""/>
-          <p:cNvSpPr/>
-          <p:nvPr/>
-        </p:nvSpPr>
-        <p:spPr>
-          <a:xfrm>
-            <a:off x="90000" y="450000"/>
-            <a:ext cx="9090000" cy="630000"/>
-          </a:xfrm>
-          <a:prstGeom prst="rect">
-            <a:avLst/>
-          </a:prstGeom>
-          <a:solidFill>
-            <a:srgbClr val="b5e77d"/>
-          </a:solidFill>
-          <a:ln w="10800">
-            <a:solidFill>
-              <a:srgbClr val="91d93f"/>
-            </a:solidFill>
-            <a:round/>
-          </a:ln>
-          <a:effectLst>
-            <a:outerShdw dist="30547" dir="2700000" blurRad="0" rotWithShape="0">
-              <a:srgbClr val="dcf1c1"/>
-            </a:outerShdw>
-          </a:effectLst>
-        </p:spPr>
-        <p:style>
-          <a:lnRef idx="0"/>
-          <a:fillRef idx="0"/>
-          <a:effectRef idx="0"/>
-          <a:fontRef idx="minor"/>
-        </p:style>
-      </p:sp>
-      <p:sp>
-        <p:nvSpPr>
-          <p:cNvPr id="5" name="PlaceHolder 2"/>
-          <p:cNvSpPr>
-            <a:spLocks noGrp="1"/>
-          </p:cNvSpPr>
-          <p:nvPr>
-            <p:ph type="title"/>
-          </p:nvPr>
-        </p:nvSpPr>
-        <p:spPr>
-          <a:xfrm>
-            <a:off x="540000" y="450000"/>
-            <a:ext cx="8640000" cy="630000"/>
-          </a:xfrm>
-          <a:prstGeom prst="rect">
-            <a:avLst/>
-          </a:prstGeom>
-          <a:noFill/>
-          <a:ln w="0">
-            <a:noFill/>
-          </a:ln>
-        </p:spPr>
-        <p:txBody>
-          <a:bodyPr lIns="0" rIns="0" tIns="0" bIns="0" anchor="ctr">
-            <a:noAutofit/>
-          </a:bodyPr>
-          <a:p>
-            <a:r>
-              <a:rPr b="0" lang="en-US" sz="2700" spc="-1" strike="noStrike">
-                <a:latin typeface="Arial"/>
-              </a:rPr>
-              <a:t>Click to edit the title text format</a:t>
-            </a:r>
-            <a:endParaRPr b="0" lang="en-US" sz="2700" spc="-1" strike="noStrike">
-              <a:latin typeface="Arial"/>
-            </a:endParaRPr>
-          </a:p>
-        </p:txBody>
-      </p:sp>
-      <p:sp>
-        <p:nvSpPr>
-          <p:cNvPr id="6" name="PlaceHolder 3"/>
+          <p:cNvPr id="2" name="PlaceHolder 3"/>
           <p:cNvSpPr>
             <a:spLocks noGrp="1"/>
           </p:cNvSpPr>
@@ -2629,8 +2534,8 @@
         </p:nvSpPr>
         <p:spPr>
           <a:xfrm>
-            <a:off x="504000" y="5164920"/>
-            <a:ext cx="2348280" cy="390960"/>
+            <a:off x="504000" y="5165280"/>
+            <a:ext cx="2348280" cy="390600"/>
           </a:xfrm>
           <a:prstGeom prst="rect">
             <a:avLst/>
@@ -2647,35 +2552,26 @@
           <a:lstStyle>
             <a:lvl1pPr>
               <a:defRPr b="0" lang="en-US" sz="1400" spc="-1" strike="noStrike">
-                <a:solidFill>
-                  <a:srgbClr val="eeeeee"/>
-                </a:solidFill>
-                <a:latin typeface="Arial"/>
+                <a:latin typeface="Times New Roman"/>
               </a:defRPr>
             </a:lvl1pPr>
           </a:lstStyle>
           <a:p>
             <a:r>
               <a:rPr b="0" lang="en-US" sz="1400" spc="-1" strike="noStrike">
-                <a:solidFill>
-                  <a:srgbClr val="eeeeee"/>
-                </a:solidFill>
-                <a:latin typeface="Arial"/>
+                <a:latin typeface="Times New Roman"/>
               </a:rPr>
               <a:t>&lt;date/time&gt;</a:t>
             </a:r>
             <a:endParaRPr b="0" lang="en-US" sz="1400" spc="-1" strike="noStrike">
-              <a:solidFill>
-                <a:srgbClr val="eeeeee"/>
-              </a:solidFill>
-              <a:latin typeface="Arial"/>
-            </a:endParaRPr>
-          </a:p>
-        </p:txBody>
-      </p:sp>
-      <p:sp>
-        <p:nvSpPr>
-          <p:cNvPr id="7" name="PlaceHolder 4"/>
+              <a:latin typeface="Times New Roman"/>
+            </a:endParaRPr>
+          </a:p>
+        </p:txBody>
+      </p:sp>
+      <p:sp>
+        <p:nvSpPr>
+          <p:cNvPr id="3" name="PlaceHolder 4"/>
           <p:cNvSpPr>
             <a:spLocks noGrp="1"/>
           </p:cNvSpPr>
@@ -2685,8 +2581,8 @@
         </p:nvSpPr>
         <p:spPr>
           <a:xfrm>
-            <a:off x="3447360" y="5164920"/>
-            <a:ext cx="3195000" cy="390960"/>
+            <a:off x="3447360" y="5165280"/>
+            <a:ext cx="3195000" cy="390600"/>
           </a:xfrm>
           <a:prstGeom prst="rect">
             <a:avLst/>
@@ -2704,10 +2600,7 @@
             <a:lvl1pPr algn="ctr">
               <a:buNone/>
               <a:defRPr b="0" lang="en-US" sz="1400" spc="-1" strike="noStrike">
-                <a:solidFill>
-                  <a:srgbClr val="eeeeee"/>
-                </a:solidFill>
-                <a:latin typeface="Arial"/>
+                <a:latin typeface="Times New Roman"/>
               </a:defRPr>
             </a:lvl1pPr>
           </a:lstStyle>
@@ -2717,25 +2610,19 @@
             </a:pPr>
             <a:r>
               <a:rPr b="0" lang="en-US" sz="1400" spc="-1" strike="noStrike">
-                <a:solidFill>
-                  <a:srgbClr val="eeeeee"/>
-                </a:solidFill>
-                <a:latin typeface="Arial"/>
+                <a:latin typeface="Times New Roman"/>
               </a:rPr>
               <a:t>&lt;footer&gt;</a:t>
             </a:r>
             <a:endParaRPr b="0" lang="en-US" sz="1400" spc="-1" strike="noStrike">
-              <a:solidFill>
-                <a:srgbClr val="eeeeee"/>
-              </a:solidFill>
-              <a:latin typeface="Arial"/>
-            </a:endParaRPr>
-          </a:p>
-        </p:txBody>
-      </p:sp>
-      <p:sp>
-        <p:nvSpPr>
-          <p:cNvPr id="8" name="PlaceHolder 5"/>
+              <a:latin typeface="Times New Roman"/>
+            </a:endParaRPr>
+          </a:p>
+        </p:txBody>
+      </p:sp>
+      <p:sp>
+        <p:nvSpPr>
+          <p:cNvPr id="4" name="PlaceHolder 5"/>
           <p:cNvSpPr>
             <a:spLocks noGrp="1"/>
           </p:cNvSpPr>
@@ -2745,8 +2632,8 @@
         </p:nvSpPr>
         <p:spPr>
           <a:xfrm>
-            <a:off x="7227000" y="5164920"/>
-            <a:ext cx="2348280" cy="390960"/>
+            <a:off x="7227360" y="5165280"/>
+            <a:ext cx="2348280" cy="390600"/>
           </a:xfrm>
           <a:prstGeom prst="rect">
             <a:avLst/>
@@ -2764,10 +2651,7 @@
             <a:lvl1pPr algn="r">
               <a:buNone/>
               <a:defRPr b="0" lang="en-US" sz="1400" spc="-1" strike="noStrike">
-                <a:solidFill>
-                  <a:srgbClr val="eeeeee"/>
-                </a:solidFill>
-                <a:latin typeface="Arial"/>
+                <a:latin typeface="Times New Roman"/>
               </a:defRPr>
             </a:lvl1pPr>
           </a:lstStyle>
@@ -2775,20 +2659,14 @@
             <a:pPr algn="r">
               <a:buNone/>
             </a:pPr>
-            <a:fld id="{B3614AEA-96BC-40BE-8F06-1BD732492FC8}" type="slidenum">
+            <a:fld id="{E2F6CC44-BD0E-4364-A97E-C28072D85DEC}" type="slidenum">
               <a:rPr b="0" lang="en-US" sz="1400" spc="-1" strike="noStrike">
-                <a:solidFill>
-                  <a:srgbClr val="eeeeee"/>
-                </a:solidFill>
-                <a:latin typeface="Arial"/>
+                <a:latin typeface="Times New Roman"/>
               </a:rPr>
               <a:t>&lt;number&gt;</a:t>
             </a:fld>
             <a:endParaRPr b="0" lang="en-US" sz="1400" spc="-1" strike="noStrike">
-              <a:solidFill>
-                <a:srgbClr val="eeeeee"/>
-              </a:solidFill>
-              <a:latin typeface="Arial"/>
+              <a:latin typeface="Times New Roman"/>
             </a:endParaRPr>
           </a:p>
         </p:txBody>
@@ -2830,6 +2708,29 @@
           <a:chExt cx="0" cy="0"/>
         </a:xfrm>
       </p:grpSpPr>
+      <p:pic>
+        <p:nvPicPr>
+          <p:cNvPr id="41" name="" descr=""/>
+          <p:cNvPicPr/>
+          <p:nvPr/>
+        </p:nvPicPr>
+        <p:blipFill>
+          <a:blip r:embed="rId1"/>
+          <a:stretch/>
+        </p:blipFill>
+        <p:spPr>
+          <a:xfrm>
+            <a:off x="4680" y="-3960"/>
+            <a:ext cx="10079640" cy="5669640"/>
+          </a:xfrm>
+          <a:prstGeom prst="rect">
+            <a:avLst/>
+          </a:prstGeom>
+          <a:ln w="0">
+            <a:noFill/>
+          </a:ln>
+        </p:spPr>
+      </p:pic>
     </p:spTree>
   </p:cSld>
   <mc:AlternateContent>
@@ -2860,6 +2761,29 @@
           <a:chExt cx="0" cy="0"/>
         </a:xfrm>
       </p:grpSpPr>
+      <p:pic>
+        <p:nvPicPr>
+          <p:cNvPr id="50" name="" descr=""/>
+          <p:cNvPicPr/>
+          <p:nvPr/>
+        </p:nvPicPr>
+        <p:blipFill>
+          <a:blip r:embed="rId1"/>
+          <a:stretch/>
+        </p:blipFill>
+        <p:spPr>
+          <a:xfrm>
+            <a:off x="4680" y="-3960"/>
+            <a:ext cx="10079640" cy="5669640"/>
+          </a:xfrm>
+          <a:prstGeom prst="rect">
+            <a:avLst/>
+          </a:prstGeom>
+          <a:ln w="0">
+            <a:noFill/>
+          </a:ln>
+        </p:spPr>
+      </p:pic>
     </p:spTree>
   </p:cSld>
   <mc:AlternateContent>
@@ -2890,6 +2814,29 @@
           <a:chExt cx="0" cy="0"/>
         </a:xfrm>
       </p:grpSpPr>
+      <p:pic>
+        <p:nvPicPr>
+          <p:cNvPr id="51" name="" descr=""/>
+          <p:cNvPicPr/>
+          <p:nvPr/>
+        </p:nvPicPr>
+        <p:blipFill>
+          <a:blip r:embed="rId1"/>
+          <a:stretch/>
+        </p:blipFill>
+        <p:spPr>
+          <a:xfrm>
+            <a:off x="4680" y="-3960"/>
+            <a:ext cx="10079640" cy="5669640"/>
+          </a:xfrm>
+          <a:prstGeom prst="rect">
+            <a:avLst/>
+          </a:prstGeom>
+          <a:ln w="0">
+            <a:noFill/>
+          </a:ln>
+        </p:spPr>
+      </p:pic>
     </p:spTree>
   </p:cSld>
   <mc:AlternateContent>
@@ -2920,6 +2867,29 @@
           <a:chExt cx="0" cy="0"/>
         </a:xfrm>
       </p:grpSpPr>
+      <p:pic>
+        <p:nvPicPr>
+          <p:cNvPr id="52" name="" descr=""/>
+          <p:cNvPicPr/>
+          <p:nvPr/>
+        </p:nvPicPr>
+        <p:blipFill>
+          <a:blip r:embed="rId1"/>
+          <a:stretch/>
+        </p:blipFill>
+        <p:spPr>
+          <a:xfrm>
+            <a:off x="4680" y="-3960"/>
+            <a:ext cx="10079640" cy="5669640"/>
+          </a:xfrm>
+          <a:prstGeom prst="rect">
+            <a:avLst/>
+          </a:prstGeom>
+          <a:ln w="0">
+            <a:noFill/>
+          </a:ln>
+        </p:spPr>
+      </p:pic>
     </p:spTree>
   </p:cSld>
   <mc:AlternateContent>
@@ -2950,6 +2920,29 @@
           <a:chExt cx="0" cy="0"/>
         </a:xfrm>
       </p:grpSpPr>
+      <p:pic>
+        <p:nvPicPr>
+          <p:cNvPr id="42" name="" descr=""/>
+          <p:cNvPicPr/>
+          <p:nvPr/>
+        </p:nvPicPr>
+        <p:blipFill>
+          <a:blip r:embed="rId1"/>
+          <a:stretch/>
+        </p:blipFill>
+        <p:spPr>
+          <a:xfrm>
+            <a:off x="4680" y="-3960"/>
+            <a:ext cx="10079640" cy="5669640"/>
+          </a:xfrm>
+          <a:prstGeom prst="rect">
+            <a:avLst/>
+          </a:prstGeom>
+          <a:ln w="0">
+            <a:noFill/>
+          </a:ln>
+        </p:spPr>
+      </p:pic>
     </p:spTree>
   </p:cSld>
   <mc:AlternateContent>
@@ -2980,6 +2973,29 @@
           <a:chExt cx="0" cy="0"/>
         </a:xfrm>
       </p:grpSpPr>
+      <p:pic>
+        <p:nvPicPr>
+          <p:cNvPr id="43" name="" descr=""/>
+          <p:cNvPicPr/>
+          <p:nvPr/>
+        </p:nvPicPr>
+        <p:blipFill>
+          <a:blip r:embed="rId1"/>
+          <a:stretch/>
+        </p:blipFill>
+        <p:spPr>
+          <a:xfrm>
+            <a:off x="4680" y="-3960"/>
+            <a:ext cx="10079640" cy="5669640"/>
+          </a:xfrm>
+          <a:prstGeom prst="rect">
+            <a:avLst/>
+          </a:prstGeom>
+          <a:ln w="0">
+            <a:noFill/>
+          </a:ln>
+        </p:spPr>
+      </p:pic>
     </p:spTree>
   </p:cSld>
   <mc:AlternateContent>
@@ -3010,6 +3026,29 @@
           <a:chExt cx="0" cy="0"/>
         </a:xfrm>
       </p:grpSpPr>
+      <p:pic>
+        <p:nvPicPr>
+          <p:cNvPr id="44" name="" descr=""/>
+          <p:cNvPicPr/>
+          <p:nvPr/>
+        </p:nvPicPr>
+        <p:blipFill>
+          <a:blip r:embed="rId1"/>
+          <a:stretch/>
+        </p:blipFill>
+        <p:spPr>
+          <a:xfrm>
+            <a:off x="4680" y="-3960"/>
+            <a:ext cx="10079640" cy="5669640"/>
+          </a:xfrm>
+          <a:prstGeom prst="rect">
+            <a:avLst/>
+          </a:prstGeom>
+          <a:ln w="0">
+            <a:noFill/>
+          </a:ln>
+        </p:spPr>
+      </p:pic>
     </p:spTree>
   </p:cSld>
   <mc:AlternateContent>
@@ -3040,6 +3079,29 @@
           <a:chExt cx="0" cy="0"/>
         </a:xfrm>
       </p:grpSpPr>
+      <p:pic>
+        <p:nvPicPr>
+          <p:cNvPr id="45" name="" descr=""/>
+          <p:cNvPicPr/>
+          <p:nvPr/>
+        </p:nvPicPr>
+        <p:blipFill>
+          <a:blip r:embed="rId1"/>
+          <a:stretch/>
+        </p:blipFill>
+        <p:spPr>
+          <a:xfrm>
+            <a:off x="4680" y="-3960"/>
+            <a:ext cx="10079640" cy="5669640"/>
+          </a:xfrm>
+          <a:prstGeom prst="rect">
+            <a:avLst/>
+          </a:prstGeom>
+          <a:ln w="0">
+            <a:noFill/>
+          </a:ln>
+        </p:spPr>
+      </p:pic>
     </p:spTree>
   </p:cSld>
   <mc:AlternateContent>
@@ -3070,6 +3132,29 @@
           <a:chExt cx="0" cy="0"/>
         </a:xfrm>
       </p:grpSpPr>
+      <p:pic>
+        <p:nvPicPr>
+          <p:cNvPr id="46" name="" descr=""/>
+          <p:cNvPicPr/>
+          <p:nvPr/>
+        </p:nvPicPr>
+        <p:blipFill>
+          <a:blip r:embed="rId1"/>
+          <a:stretch/>
+        </p:blipFill>
+        <p:spPr>
+          <a:xfrm>
+            <a:off x="4680" y="-3960"/>
+            <a:ext cx="10079640" cy="5669640"/>
+          </a:xfrm>
+          <a:prstGeom prst="rect">
+            <a:avLst/>
+          </a:prstGeom>
+          <a:ln w="0">
+            <a:noFill/>
+          </a:ln>
+        </p:spPr>
+      </p:pic>
     </p:spTree>
   </p:cSld>
   <mc:AlternateContent>
@@ -3100,6 +3185,29 @@
           <a:chExt cx="0" cy="0"/>
         </a:xfrm>
       </p:grpSpPr>
+      <p:pic>
+        <p:nvPicPr>
+          <p:cNvPr id="47" name="" descr=""/>
+          <p:cNvPicPr/>
+          <p:nvPr/>
+        </p:nvPicPr>
+        <p:blipFill>
+          <a:blip r:embed="rId1"/>
+          <a:stretch/>
+        </p:blipFill>
+        <p:spPr>
+          <a:xfrm>
+            <a:off x="4680" y="-3960"/>
+            <a:ext cx="10079640" cy="5669640"/>
+          </a:xfrm>
+          <a:prstGeom prst="rect">
+            <a:avLst/>
+          </a:prstGeom>
+          <a:ln w="0">
+            <a:noFill/>
+          </a:ln>
+        </p:spPr>
+      </p:pic>
     </p:spTree>
   </p:cSld>
   <mc:AlternateContent>
@@ -3130,6 +3238,29 @@
           <a:chExt cx="0" cy="0"/>
         </a:xfrm>
       </p:grpSpPr>
+      <p:pic>
+        <p:nvPicPr>
+          <p:cNvPr id="48" name="" descr=""/>
+          <p:cNvPicPr/>
+          <p:nvPr/>
+        </p:nvPicPr>
+        <p:blipFill>
+          <a:blip r:embed="rId1"/>
+          <a:stretch/>
+        </p:blipFill>
+        <p:spPr>
+          <a:xfrm>
+            <a:off x="4680" y="-3960"/>
+            <a:ext cx="10079640" cy="5669640"/>
+          </a:xfrm>
+          <a:prstGeom prst="rect">
+            <a:avLst/>
+          </a:prstGeom>
+          <a:ln w="0">
+            <a:noFill/>
+          </a:ln>
+        </p:spPr>
+      </p:pic>
     </p:spTree>
   </p:cSld>
   <mc:AlternateContent>
@@ -3160,6 +3291,29 @@
           <a:chExt cx="0" cy="0"/>
         </a:xfrm>
       </p:grpSpPr>
+      <p:pic>
+        <p:nvPicPr>
+          <p:cNvPr id="49" name="" descr=""/>
+          <p:cNvPicPr/>
+          <p:nvPr/>
+        </p:nvPicPr>
+        <p:blipFill>
+          <a:blip r:embed="rId1"/>
+          <a:stretch/>
+        </p:blipFill>
+        <p:spPr>
+          <a:xfrm>
+            <a:off x="4680" y="-3960"/>
+            <a:ext cx="10079640" cy="5669640"/>
+          </a:xfrm>
+          <a:prstGeom prst="rect">
+            <a:avLst/>
+          </a:prstGeom>
+          <a:ln w="0">
+            <a:noFill/>
+          </a:ln>
+        </p:spPr>
+      </p:pic>
     </p:spTree>
   </p:cSld>
   <mc:AlternateContent>

</xml_diff>